<commit_message>
Add Question (bombs), score and collision
Added bombs (questions) from assignments.
Added collision functionality betweeen student and bombs and solution arrows and assignment. Also added score
</commit_message>
<xml_diff>
--- a/graphics/GameGraphics.pptx
+++ b/graphics/GameGraphics.pptx
@@ -8,6 +8,7 @@
     <p:sldId id="256" r:id="rId2"/>
     <p:sldId id="257" r:id="rId3"/>
     <p:sldId id="258" r:id="rId4"/>
+    <p:sldId id="259" r:id="rId5"/>
   </p:sldIdLst>
   <p:sldSz cx="12192000" cy="6858000"/>
   <p:notesSz cx="6858000" cy="9144000"/>
@@ -263,7 +264,7 @@
           <a:p>
             <a:fld id="{7271C931-E283-42CD-9E41-BF1CB4AD606B}" type="datetimeFigureOut">
               <a:rPr lang="en-IN" smtClean="0"/>
-              <a:t>17-10-2023</a:t>
+              <a:t>19-10-2023</a:t>
             </a:fld>
             <a:endParaRPr lang="en-IN"/>
           </a:p>
@@ -463,7 +464,7 @@
           <a:p>
             <a:fld id="{7271C931-E283-42CD-9E41-BF1CB4AD606B}" type="datetimeFigureOut">
               <a:rPr lang="en-IN" smtClean="0"/>
-              <a:t>17-10-2023</a:t>
+              <a:t>19-10-2023</a:t>
             </a:fld>
             <a:endParaRPr lang="en-IN"/>
           </a:p>
@@ -673,7 +674,7 @@
           <a:p>
             <a:fld id="{7271C931-E283-42CD-9E41-BF1CB4AD606B}" type="datetimeFigureOut">
               <a:rPr lang="en-IN" smtClean="0"/>
-              <a:t>17-10-2023</a:t>
+              <a:t>19-10-2023</a:t>
             </a:fld>
             <a:endParaRPr lang="en-IN"/>
           </a:p>
@@ -873,7 +874,7 @@
           <a:p>
             <a:fld id="{7271C931-E283-42CD-9E41-BF1CB4AD606B}" type="datetimeFigureOut">
               <a:rPr lang="en-IN" smtClean="0"/>
-              <a:t>17-10-2023</a:t>
+              <a:t>19-10-2023</a:t>
             </a:fld>
             <a:endParaRPr lang="en-IN"/>
           </a:p>
@@ -1149,7 +1150,7 @@
           <a:p>
             <a:fld id="{7271C931-E283-42CD-9E41-BF1CB4AD606B}" type="datetimeFigureOut">
               <a:rPr lang="en-IN" smtClean="0"/>
-              <a:t>17-10-2023</a:t>
+              <a:t>19-10-2023</a:t>
             </a:fld>
             <a:endParaRPr lang="en-IN"/>
           </a:p>
@@ -1417,7 +1418,7 @@
           <a:p>
             <a:fld id="{7271C931-E283-42CD-9E41-BF1CB4AD606B}" type="datetimeFigureOut">
               <a:rPr lang="en-IN" smtClean="0"/>
-              <a:t>17-10-2023</a:t>
+              <a:t>19-10-2023</a:t>
             </a:fld>
             <a:endParaRPr lang="en-IN"/>
           </a:p>
@@ -1832,7 +1833,7 @@
           <a:p>
             <a:fld id="{7271C931-E283-42CD-9E41-BF1CB4AD606B}" type="datetimeFigureOut">
               <a:rPr lang="en-IN" smtClean="0"/>
-              <a:t>17-10-2023</a:t>
+              <a:t>19-10-2023</a:t>
             </a:fld>
             <a:endParaRPr lang="en-IN"/>
           </a:p>
@@ -1974,7 +1975,7 @@
           <a:p>
             <a:fld id="{7271C931-E283-42CD-9E41-BF1CB4AD606B}" type="datetimeFigureOut">
               <a:rPr lang="en-IN" smtClean="0"/>
-              <a:t>17-10-2023</a:t>
+              <a:t>19-10-2023</a:t>
             </a:fld>
             <a:endParaRPr lang="en-IN"/>
           </a:p>
@@ -2087,7 +2088,7 @@
           <a:p>
             <a:fld id="{7271C931-E283-42CD-9E41-BF1CB4AD606B}" type="datetimeFigureOut">
               <a:rPr lang="en-IN" smtClean="0"/>
-              <a:t>17-10-2023</a:t>
+              <a:t>19-10-2023</a:t>
             </a:fld>
             <a:endParaRPr lang="en-IN"/>
           </a:p>
@@ -2400,7 +2401,7 @@
           <a:p>
             <a:fld id="{7271C931-E283-42CD-9E41-BF1CB4AD606B}" type="datetimeFigureOut">
               <a:rPr lang="en-IN" smtClean="0"/>
-              <a:t>17-10-2023</a:t>
+              <a:t>19-10-2023</a:t>
             </a:fld>
             <a:endParaRPr lang="en-IN"/>
           </a:p>
@@ -2689,7 +2690,7 @@
           <a:p>
             <a:fld id="{7271C931-E283-42CD-9E41-BF1CB4AD606B}" type="datetimeFigureOut">
               <a:rPr lang="en-IN" smtClean="0"/>
-              <a:t>17-10-2023</a:t>
+              <a:t>19-10-2023</a:t>
             </a:fld>
             <a:endParaRPr lang="en-IN"/>
           </a:p>
@@ -2932,7 +2933,7 @@
           <a:p>
             <a:fld id="{7271C931-E283-42CD-9E41-BF1CB4AD606B}" type="datetimeFigureOut">
               <a:rPr lang="en-IN" smtClean="0"/>
-              <a:t>17-10-2023</a:t>
+              <a:t>19-10-2023</a:t>
             </a:fld>
             <a:endParaRPr lang="en-IN"/>
           </a:p>
@@ -4973,6 +4974,196 @@
 </p:sld>
 </file>
 
+<file path=ppt/slides/slide4.xml><?xml version="1.0" encoding="utf-8"?>
+<p:sld xmlns:a="http://schemas.openxmlformats.org/drawingml/2006/main" xmlns:r="http://schemas.openxmlformats.org/officeDocument/2006/relationships" xmlns:p="http://schemas.openxmlformats.org/presentationml/2006/main">
+  <p:cSld>
+    <p:spTree>
+      <p:nvGrpSpPr>
+        <p:cNvPr id="1" name=""/>
+        <p:cNvGrpSpPr/>
+        <p:nvPr/>
+      </p:nvGrpSpPr>
+      <p:grpSpPr>
+        <a:xfrm>
+          <a:off x="0" y="0"/>
+          <a:ext cx="0" cy="0"/>
+          <a:chOff x="0" y="0"/>
+          <a:chExt cx="0" cy="0"/>
+        </a:xfrm>
+      </p:grpSpPr>
+      <p:sp>
+        <p:nvSpPr>
+          <p:cNvPr id="3" name="TextBox 2">
+            <a:extLst>
+              <a:ext uri="{FF2B5EF4-FFF2-40B4-BE49-F238E27FC236}">
+                <a16:creationId xmlns:a16="http://schemas.microsoft.com/office/drawing/2014/main" id="{EE05DAB8-1B34-C4D9-8B3F-1A6F6D2B88AA}"/>
+              </a:ext>
+            </a:extLst>
+          </p:cNvPr>
+          <p:cNvSpPr txBox="1"/>
+          <p:nvPr/>
+        </p:nvSpPr>
+        <p:spPr>
+          <a:xfrm>
+            <a:off x="8839200" y="2478157"/>
+            <a:ext cx="569843" cy="369332"/>
+          </a:xfrm>
+          <a:prstGeom prst="rect">
+            <a:avLst/>
+          </a:prstGeom>
+          <a:noFill/>
+        </p:spPr>
+        <p:txBody>
+          <a:bodyPr wrap="square" rtlCol="0">
+            <a:spAutoFit/>
+          </a:bodyPr>
+          <a:lstStyle/>
+          <a:p>
+            <a:r>
+              <a:rPr lang="en-IN" dirty="0"/>
+              <a:t>Q</a:t>
+            </a:r>
+          </a:p>
+        </p:txBody>
+      </p:sp>
+      <p:grpSp>
+        <p:nvGrpSpPr>
+          <p:cNvPr id="5" name="Group 4">
+            <a:extLst>
+              <a:ext uri="{FF2B5EF4-FFF2-40B4-BE49-F238E27FC236}">
+                <a16:creationId xmlns:a16="http://schemas.microsoft.com/office/drawing/2014/main" id="{B58BA784-AF18-1A5A-C3D1-DB91AC74FBCD}"/>
+              </a:ext>
+            </a:extLst>
+          </p:cNvPr>
+          <p:cNvGrpSpPr/>
+          <p:nvPr/>
+        </p:nvGrpSpPr>
+        <p:grpSpPr>
+          <a:xfrm>
+            <a:off x="5031357" y="2328061"/>
+            <a:ext cx="1371603" cy="2146854"/>
+            <a:chOff x="5031357" y="2328061"/>
+            <a:chExt cx="1371603" cy="2146854"/>
+          </a:xfrm>
+        </p:grpSpPr>
+        <p:sp>
+          <p:nvSpPr>
+            <p:cNvPr id="2" name="Flowchart: Stored Data 1">
+              <a:extLst>
+                <a:ext uri="{FF2B5EF4-FFF2-40B4-BE49-F238E27FC236}">
+                  <a16:creationId xmlns:a16="http://schemas.microsoft.com/office/drawing/2014/main" id="{379A197B-4021-4914-AE0F-15EED47DDB69}"/>
+                </a:ext>
+              </a:extLst>
+            </p:cNvPr>
+            <p:cNvSpPr/>
+            <p:nvPr/>
+          </p:nvSpPr>
+          <p:spPr>
+            <a:xfrm rot="5400000">
+              <a:off x="4643732" y="2715688"/>
+              <a:ext cx="2146852" cy="1371601"/>
+            </a:xfrm>
+            <a:prstGeom prst="homePlate">
+              <a:avLst/>
+            </a:prstGeom>
+            <a:solidFill>
+              <a:srgbClr val="FF0000"/>
+            </a:solidFill>
+            <a:ln>
+              <a:noFill/>
+            </a:ln>
+          </p:spPr>
+          <p:style>
+            <a:lnRef idx="2">
+              <a:schemeClr val="accent1">
+                <a:shade val="15000"/>
+              </a:schemeClr>
+            </a:lnRef>
+            <a:fillRef idx="1">
+              <a:schemeClr val="accent1"/>
+            </a:fillRef>
+            <a:effectRef idx="0">
+              <a:schemeClr val="accent1"/>
+            </a:effectRef>
+            <a:fontRef idx="minor">
+              <a:schemeClr val="lt1"/>
+            </a:fontRef>
+          </p:style>
+          <p:txBody>
+            <a:bodyPr rtlCol="0" anchor="ctr"/>
+            <a:lstStyle/>
+            <a:p>
+              <a:pPr algn="ctr"/>
+              <a:endParaRPr lang="en-IN" dirty="0"/>
+            </a:p>
+          </p:txBody>
+        </p:sp>
+        <p:sp>
+          <p:nvSpPr>
+            <p:cNvPr id="4" name="Rectangle 3">
+              <a:extLst>
+                <a:ext uri="{FF2B5EF4-FFF2-40B4-BE49-F238E27FC236}">
+                  <a16:creationId xmlns:a16="http://schemas.microsoft.com/office/drawing/2014/main" id="{1DB3A729-123B-F511-8293-948970A6245B}"/>
+                </a:ext>
+              </a:extLst>
+            </p:cNvPr>
+            <p:cNvSpPr/>
+            <p:nvPr/>
+          </p:nvSpPr>
+          <p:spPr>
+            <a:xfrm>
+              <a:off x="5031358" y="2328061"/>
+              <a:ext cx="1371602" cy="1569660"/>
+            </a:xfrm>
+            <a:prstGeom prst="rect">
+              <a:avLst/>
+            </a:prstGeom>
+            <a:noFill/>
+          </p:spPr>
+          <p:txBody>
+            <a:bodyPr wrap="square" lIns="91440" tIns="45720" rIns="91440" bIns="45720">
+              <a:spAutoFit/>
+            </a:bodyPr>
+            <a:lstStyle/>
+            <a:p>
+              <a:pPr algn="ctr"/>
+              <a:r>
+                <a:rPr lang="en-IN" sz="9600" b="0" cap="none" spc="0" dirty="0">
+                  <a:ln w="0"/>
+                  <a:solidFill>
+                    <a:schemeClr val="bg2">
+                      <a:lumMod val="50000"/>
+                    </a:schemeClr>
+                  </a:solidFill>
+                  <a:effectLst>
+                    <a:outerShdw blurRad="38100" dist="19050" dir="2700000" algn="tl" rotWithShape="0">
+                      <a:schemeClr val="dk1">
+                        <a:alpha val="40000"/>
+                      </a:schemeClr>
+                    </a:outerShdw>
+                  </a:effectLst>
+                  <a:latin typeface="Times New Roman" panose="02020603050405020304" pitchFamily="18" charset="0"/>
+                  <a:cs typeface="Times New Roman" panose="02020603050405020304" pitchFamily="18" charset="0"/>
+                </a:rPr>
+                <a:t>Q</a:t>
+              </a:r>
+            </a:p>
+          </p:txBody>
+        </p:sp>
+      </p:grpSp>
+    </p:spTree>
+    <p:extLst>
+      <p:ext uri="{BB962C8B-B14F-4D97-AF65-F5344CB8AC3E}">
+        <p14:creationId xmlns:p14="http://schemas.microsoft.com/office/powerpoint/2010/main" val="2306395139"/>
+      </p:ext>
+    </p:extLst>
+  </p:cSld>
+  <p:clrMapOvr>
+    <a:masterClrMapping/>
+  </p:clrMapOvr>
+</p:sld>
+</file>
+
 <file path=ppt/theme/theme1.xml><?xml version="1.0" encoding="utf-8"?>
 <a:theme xmlns:a="http://schemas.openxmlformats.org/drawingml/2006/main" name="Office Theme">
   <a:themeElements>

</xml_diff>